<commit_message>
changed orthogonal variability model
</commit_message>
<xml_diff>
--- a/Doku/UserManualGenerator-orthogonal_variability_model.pptx
+++ b/Doku/UserManualGenerator-orthogonal_variability_model.pptx
@@ -243,7 +243,7 @@
           <a:p>
             <a:fld id="{01AE0786-1C43-41E6-95D2-4A405CF02558}" type="datetimeFigureOut">
               <a:rPr lang="de-DE" smtClean="0"/>
-              <a:t>14.11.2018</a:t>
+              <a:t>15.11.2018</a:t>
             </a:fld>
             <a:endParaRPr lang="de-DE"/>
           </a:p>
@@ -413,7 +413,7 @@
           <a:p>
             <a:fld id="{01AE0786-1C43-41E6-95D2-4A405CF02558}" type="datetimeFigureOut">
               <a:rPr lang="de-DE" smtClean="0"/>
-              <a:t>14.11.2018</a:t>
+              <a:t>15.11.2018</a:t>
             </a:fld>
             <a:endParaRPr lang="de-DE"/>
           </a:p>
@@ -593,7 +593,7 @@
           <a:p>
             <a:fld id="{01AE0786-1C43-41E6-95D2-4A405CF02558}" type="datetimeFigureOut">
               <a:rPr lang="de-DE" smtClean="0"/>
-              <a:t>14.11.2018</a:t>
+              <a:t>15.11.2018</a:t>
             </a:fld>
             <a:endParaRPr lang="de-DE"/>
           </a:p>
@@ -763,7 +763,7 @@
           <a:p>
             <a:fld id="{01AE0786-1C43-41E6-95D2-4A405CF02558}" type="datetimeFigureOut">
               <a:rPr lang="de-DE" smtClean="0"/>
-              <a:t>14.11.2018</a:t>
+              <a:t>15.11.2018</a:t>
             </a:fld>
             <a:endParaRPr lang="de-DE"/>
           </a:p>
@@ -1009,7 +1009,7 @@
           <a:p>
             <a:fld id="{01AE0786-1C43-41E6-95D2-4A405CF02558}" type="datetimeFigureOut">
               <a:rPr lang="de-DE" smtClean="0"/>
-              <a:t>14.11.2018</a:t>
+              <a:t>15.11.2018</a:t>
             </a:fld>
             <a:endParaRPr lang="de-DE"/>
           </a:p>
@@ -1241,7 +1241,7 @@
           <a:p>
             <a:fld id="{01AE0786-1C43-41E6-95D2-4A405CF02558}" type="datetimeFigureOut">
               <a:rPr lang="de-DE" smtClean="0"/>
-              <a:t>14.11.2018</a:t>
+              <a:t>15.11.2018</a:t>
             </a:fld>
             <a:endParaRPr lang="de-DE"/>
           </a:p>
@@ -1608,7 +1608,7 @@
           <a:p>
             <a:fld id="{01AE0786-1C43-41E6-95D2-4A405CF02558}" type="datetimeFigureOut">
               <a:rPr lang="de-DE" smtClean="0"/>
-              <a:t>14.11.2018</a:t>
+              <a:t>15.11.2018</a:t>
             </a:fld>
             <a:endParaRPr lang="de-DE"/>
           </a:p>
@@ -1726,7 +1726,7 @@
           <a:p>
             <a:fld id="{01AE0786-1C43-41E6-95D2-4A405CF02558}" type="datetimeFigureOut">
               <a:rPr lang="de-DE" smtClean="0"/>
-              <a:t>14.11.2018</a:t>
+              <a:t>15.11.2018</a:t>
             </a:fld>
             <a:endParaRPr lang="de-DE"/>
           </a:p>
@@ -1821,7 +1821,7 @@
           <a:p>
             <a:fld id="{01AE0786-1C43-41E6-95D2-4A405CF02558}" type="datetimeFigureOut">
               <a:rPr lang="de-DE" smtClean="0"/>
-              <a:t>14.11.2018</a:t>
+              <a:t>15.11.2018</a:t>
             </a:fld>
             <a:endParaRPr lang="de-DE"/>
           </a:p>
@@ -2098,7 +2098,7 @@
           <a:p>
             <a:fld id="{01AE0786-1C43-41E6-95D2-4A405CF02558}" type="datetimeFigureOut">
               <a:rPr lang="de-DE" smtClean="0"/>
-              <a:t>14.11.2018</a:t>
+              <a:t>15.11.2018</a:t>
             </a:fld>
             <a:endParaRPr lang="de-DE"/>
           </a:p>
@@ -2351,7 +2351,7 @@
           <a:p>
             <a:fld id="{01AE0786-1C43-41E6-95D2-4A405CF02558}" type="datetimeFigureOut">
               <a:rPr lang="de-DE" smtClean="0"/>
-              <a:t>14.11.2018</a:t>
+              <a:t>15.11.2018</a:t>
             </a:fld>
             <a:endParaRPr lang="de-DE"/>
           </a:p>
@@ -2564,7 +2564,7 @@
           <a:p>
             <a:fld id="{01AE0786-1C43-41E6-95D2-4A405CF02558}" type="datetimeFigureOut">
               <a:rPr lang="de-DE" smtClean="0"/>
-              <a:t>14.11.2018</a:t>
+              <a:t>15.11.2018</a:t>
             </a:fld>
             <a:endParaRPr lang="de-DE"/>
           </a:p>
@@ -2977,8 +2977,8 @@
         </p:nvGrpSpPr>
         <p:grpSpPr>
           <a:xfrm>
-            <a:off x="1998047" y="1522838"/>
-            <a:ext cx="1379913" cy="698269"/>
+            <a:off x="1714756" y="1522838"/>
+            <a:ext cx="1655287" cy="698269"/>
             <a:chOff x="224442" y="3981796"/>
             <a:chExt cx="1379913" cy="698269"/>
           </a:xfrm>
@@ -3018,8 +3018,8 @@
             <a:p>
               <a:pPr algn="ctr"/>
               <a:r>
-                <a:rPr lang="de-DE" dirty="0" smtClean="0"/>
-                <a:t>Griesheim</a:t>
+                <a:rPr lang="de-DE" dirty="0" err="1" smtClean="0"/>
+                <a:t>string</a:t>
               </a:r>
               <a:endParaRPr lang="de-DE" dirty="0"/>
             </a:p>
@@ -3033,8 +3033,8 @@
           </p:nvSpPr>
           <p:spPr>
             <a:xfrm>
-              <a:off x="224443" y="3981796"/>
-              <a:ext cx="282633" cy="216131"/>
+              <a:off x="224444" y="3981796"/>
+              <a:ext cx="383949" cy="342288"/>
             </a:xfrm>
             <a:prstGeom prst="rect">
               <a:avLst/>
@@ -3063,209 +3063,7 @@
               <a:pPr algn="ctr"/>
               <a:r>
                 <a:rPr lang="de-DE" dirty="0" smtClean="0"/>
-                <a:t>V</a:t>
-              </a:r>
-              <a:endParaRPr lang="de-DE" dirty="0"/>
-            </a:p>
-          </p:txBody>
-        </p:sp>
-      </p:grpSp>
-      <p:grpSp>
-        <p:nvGrpSpPr>
-          <p:cNvPr id="9" name="Gruppieren 8"/>
-          <p:cNvGrpSpPr/>
-          <p:nvPr/>
-        </p:nvGrpSpPr>
-        <p:grpSpPr>
-          <a:xfrm>
-            <a:off x="354898" y="1508739"/>
-            <a:ext cx="1379913" cy="698269"/>
-            <a:chOff x="224442" y="3981796"/>
-            <a:chExt cx="1379913" cy="698269"/>
-          </a:xfrm>
-        </p:grpSpPr>
-        <p:sp>
-          <p:nvSpPr>
-            <p:cNvPr id="10" name="Rechteck 9"/>
-            <p:cNvSpPr/>
-            <p:nvPr/>
-          </p:nvSpPr>
-          <p:spPr>
-            <a:xfrm>
-              <a:off x="224442" y="3981796"/>
-              <a:ext cx="1379913" cy="698269"/>
-            </a:xfrm>
-            <a:prstGeom prst="rect">
-              <a:avLst/>
-            </a:prstGeom>
-          </p:spPr>
-          <p:style>
-            <a:lnRef idx="2">
-              <a:schemeClr val="dk1"/>
-            </a:lnRef>
-            <a:fillRef idx="1">
-              <a:schemeClr val="lt1"/>
-            </a:fillRef>
-            <a:effectRef idx="0">
-              <a:schemeClr val="dk1"/>
-            </a:effectRef>
-            <a:fontRef idx="minor">
-              <a:schemeClr val="dk1"/>
-            </a:fontRef>
-          </p:style>
-          <p:txBody>
-            <a:bodyPr rtlCol="0" anchor="ctr"/>
-            <a:lstStyle/>
-            <a:p>
-              <a:pPr algn="ctr"/>
-              <a:r>
-                <a:rPr lang="de-DE" dirty="0" smtClean="0"/>
-                <a:t>Darmstadt</a:t>
-              </a:r>
-              <a:endParaRPr lang="de-DE" dirty="0"/>
-            </a:p>
-          </p:txBody>
-        </p:sp>
-        <p:sp>
-          <p:nvSpPr>
-            <p:cNvPr id="11" name="Rechteck 10"/>
-            <p:cNvSpPr/>
-            <p:nvPr/>
-          </p:nvSpPr>
-          <p:spPr>
-            <a:xfrm>
-              <a:off x="224443" y="3981796"/>
-              <a:ext cx="282633" cy="216131"/>
-            </a:xfrm>
-            <a:prstGeom prst="rect">
-              <a:avLst/>
-            </a:prstGeom>
-          </p:spPr>
-          <p:style>
-            <a:lnRef idx="2">
-              <a:schemeClr val="dk1">
-                <a:shade val="50000"/>
-              </a:schemeClr>
-            </a:lnRef>
-            <a:fillRef idx="1">
-              <a:schemeClr val="dk1"/>
-            </a:fillRef>
-            <a:effectRef idx="0">
-              <a:schemeClr val="dk1"/>
-            </a:effectRef>
-            <a:fontRef idx="minor">
-              <a:schemeClr val="lt1"/>
-            </a:fontRef>
-          </p:style>
-          <p:txBody>
-            <a:bodyPr rtlCol="0" anchor="ctr"/>
-            <a:lstStyle/>
-            <a:p>
-              <a:pPr algn="ctr"/>
-              <a:r>
-                <a:rPr lang="de-DE" dirty="0" smtClean="0"/>
-                <a:t>V</a:t>
-              </a:r>
-              <a:endParaRPr lang="de-DE" dirty="0"/>
-            </a:p>
-          </p:txBody>
-        </p:sp>
-      </p:grpSp>
-      <p:grpSp>
-        <p:nvGrpSpPr>
-          <p:cNvPr id="12" name="Gruppieren 11"/>
-          <p:cNvGrpSpPr/>
-          <p:nvPr/>
-        </p:nvGrpSpPr>
-        <p:grpSpPr>
-          <a:xfrm>
-            <a:off x="3653334" y="1522838"/>
-            <a:ext cx="1379913" cy="698269"/>
-            <a:chOff x="224442" y="3981796"/>
-            <a:chExt cx="1379913" cy="698269"/>
-          </a:xfrm>
-        </p:grpSpPr>
-        <p:sp>
-          <p:nvSpPr>
-            <p:cNvPr id="13" name="Rechteck 12"/>
-            <p:cNvSpPr/>
-            <p:nvPr/>
-          </p:nvSpPr>
-          <p:spPr>
-            <a:xfrm>
-              <a:off x="224442" y="3981796"/>
-              <a:ext cx="1379913" cy="698269"/>
-            </a:xfrm>
-            <a:prstGeom prst="rect">
-              <a:avLst/>
-            </a:prstGeom>
-          </p:spPr>
-          <p:style>
-            <a:lnRef idx="2">
-              <a:schemeClr val="dk1"/>
-            </a:lnRef>
-            <a:fillRef idx="1">
-              <a:schemeClr val="lt1"/>
-            </a:fillRef>
-            <a:effectRef idx="0">
-              <a:schemeClr val="dk1"/>
-            </a:effectRef>
-            <a:fontRef idx="minor">
-              <a:schemeClr val="dk1"/>
-            </a:fontRef>
-          </p:style>
-          <p:txBody>
-            <a:bodyPr rtlCol="0" anchor="ctr"/>
-            <a:lstStyle/>
-            <a:p>
-              <a:pPr algn="ctr"/>
-              <a:r>
-                <a:rPr lang="de-DE" dirty="0" smtClean="0"/>
-                <a:t>Dieburg</a:t>
-              </a:r>
-              <a:endParaRPr lang="de-DE" dirty="0"/>
-            </a:p>
-          </p:txBody>
-        </p:sp>
-        <p:sp>
-          <p:nvSpPr>
-            <p:cNvPr id="14" name="Rechteck 13"/>
-            <p:cNvSpPr/>
-            <p:nvPr/>
-          </p:nvSpPr>
-          <p:spPr>
-            <a:xfrm>
-              <a:off x="224443" y="3981796"/>
-              <a:ext cx="282633" cy="216131"/>
-            </a:xfrm>
-            <a:prstGeom prst="rect">
-              <a:avLst/>
-            </a:prstGeom>
-          </p:spPr>
-          <p:style>
-            <a:lnRef idx="2">
-              <a:schemeClr val="dk1">
-                <a:shade val="50000"/>
-              </a:schemeClr>
-            </a:lnRef>
-            <a:fillRef idx="1">
-              <a:schemeClr val="dk1"/>
-            </a:fillRef>
-            <a:effectRef idx="0">
-              <a:schemeClr val="dk1"/>
-            </a:effectRef>
-            <a:fontRef idx="minor">
-              <a:schemeClr val="lt1"/>
-            </a:fontRef>
-          </p:style>
-          <p:txBody>
-            <a:bodyPr rtlCol="0" anchor="ctr"/>
-            <a:lstStyle/>
-            <a:p>
-              <a:pPr algn="ctr"/>
-              <a:r>
-                <a:rPr lang="de-DE" dirty="0" smtClean="0"/>
-                <a:t>V</a:t>
+                <a:t>V?</a:t>
               </a:r>
               <a:endParaRPr lang="de-DE" dirty="0"/>
             </a:p>
@@ -3381,7 +3179,7 @@
         </p:nvGrpSpPr>
         <p:grpSpPr>
           <a:xfrm>
-            <a:off x="7686996" y="2076795"/>
+            <a:off x="8460080" y="1264060"/>
             <a:ext cx="3903449" cy="1518334"/>
             <a:chOff x="1180409" y="814648"/>
             <a:chExt cx="2926078" cy="1155469"/>
@@ -3482,9 +3280,9 @@
         </p:nvGrpSpPr>
         <p:grpSpPr>
           <a:xfrm>
-            <a:off x="8056055" y="3861602"/>
+            <a:off x="8258797" y="3138484"/>
             <a:ext cx="1379913" cy="698269"/>
-            <a:chOff x="224442" y="3981796"/>
+            <a:chOff x="427184" y="3258678"/>
             <a:chExt cx="1379913" cy="698269"/>
           </a:xfrm>
         </p:grpSpPr>
@@ -3496,7 +3294,7 @@
           </p:nvSpPr>
           <p:spPr>
             <a:xfrm>
-              <a:off x="224442" y="3981796"/>
+              <a:off x="427184" y="3258678"/>
               <a:ext cx="1379913" cy="698269"/>
             </a:xfrm>
             <a:prstGeom prst="rect">
@@ -3554,8 +3352,8 @@
           </p:nvSpPr>
           <p:spPr>
             <a:xfrm>
-              <a:off x="224443" y="3981796"/>
-              <a:ext cx="282633" cy="216131"/>
+              <a:off x="431442" y="3259945"/>
+              <a:ext cx="223398" cy="234042"/>
             </a:xfrm>
             <a:prstGeom prst="rect">
               <a:avLst/>
@@ -3599,7 +3397,7 @@
         </p:nvGrpSpPr>
         <p:grpSpPr>
           <a:xfrm>
-            <a:off x="9801827" y="3861602"/>
+            <a:off x="10411805" y="3293006"/>
             <a:ext cx="1379913" cy="698269"/>
             <a:chOff x="224442" y="3981796"/>
             <a:chExt cx="1379913" cy="698269"/>
@@ -3809,7 +3607,7 @@
         </p:nvGrpSpPr>
         <p:grpSpPr>
           <a:xfrm>
-            <a:off x="2981446" y="3337511"/>
+            <a:off x="3285601" y="3246363"/>
             <a:ext cx="3871887" cy="1609905"/>
             <a:chOff x="1180409" y="814648"/>
             <a:chExt cx="2926078" cy="1155469"/>
@@ -4439,7 +4237,7 @@
         </p:nvGrpSpPr>
         <p:grpSpPr>
           <a:xfrm>
-            <a:off x="8643637" y="5143278"/>
+            <a:off x="8746012" y="4195432"/>
             <a:ext cx="3272790" cy="1256907"/>
             <a:chOff x="1180409" y="814647"/>
             <a:chExt cx="2926078" cy="1155470"/>
@@ -4534,48 +4332,6 @@
       </p:grpSp>
       <p:cxnSp>
         <p:nvCxnSpPr>
-          <p:cNvPr id="3" name="Gerader Verbinder 2"/>
-          <p:cNvCxnSpPr>
-            <a:stCxn id="4" idx="3"/>
-            <a:endCxn id="10" idx="0"/>
-          </p:cNvCxnSpPr>
-          <p:nvPr/>
-        </p:nvCxnSpPr>
-        <p:spPr>
-          <a:xfrm flipH="1">
-            <a:off x="1044855" y="1271847"/>
-            <a:ext cx="1485859" cy="236892"/>
-          </a:xfrm>
-          <a:prstGeom prst="line">
-            <a:avLst/>
-          </a:prstGeom>
-          <a:ln w="9525" cap="flat" cmpd="sng" algn="ctr">
-            <a:solidFill>
-              <a:schemeClr val="dk1"/>
-            </a:solidFill>
-            <a:prstDash val="dash"/>
-            <a:round/>
-            <a:headEnd type="none" w="med" len="med"/>
-            <a:tailEnd type="none" w="med" len="med"/>
-          </a:ln>
-        </p:spPr>
-        <p:style>
-          <a:lnRef idx="0">
-            <a:scrgbClr r="0" g="0" b="0"/>
-          </a:lnRef>
-          <a:fillRef idx="0">
-            <a:scrgbClr r="0" g="0" b="0"/>
-          </a:fillRef>
-          <a:effectRef idx="0">
-            <a:scrgbClr r="0" g="0" b="0"/>
-          </a:effectRef>
-          <a:fontRef idx="minor">
-            <a:schemeClr val="tx1"/>
-          </a:fontRef>
-        </p:style>
-      </p:cxnSp>
-      <p:cxnSp>
-        <p:nvCxnSpPr>
           <p:cNvPr id="15" name="Gerader Verbinder 14"/>
           <p:cNvCxnSpPr>
             <a:stCxn id="4" idx="3"/>
@@ -4586,49 +4342,7 @@
         <p:spPr>
           <a:xfrm>
             <a:off x="2530714" y="1271847"/>
-            <a:ext cx="157290" cy="250991"/>
-          </a:xfrm>
-          <a:prstGeom prst="line">
-            <a:avLst/>
-          </a:prstGeom>
-          <a:ln w="9525" cap="flat" cmpd="sng" algn="ctr">
-            <a:solidFill>
-              <a:schemeClr val="dk1"/>
-            </a:solidFill>
-            <a:prstDash val="dash"/>
-            <a:round/>
-            <a:headEnd type="none" w="med" len="med"/>
-            <a:tailEnd type="none" w="med" len="med"/>
-          </a:ln>
-        </p:spPr>
-        <p:style>
-          <a:lnRef idx="0">
-            <a:scrgbClr r="0" g="0" b="0"/>
-          </a:lnRef>
-          <a:fillRef idx="0">
-            <a:scrgbClr r="0" g="0" b="0"/>
-          </a:fillRef>
-          <a:effectRef idx="0">
-            <a:scrgbClr r="0" g="0" b="0"/>
-          </a:effectRef>
-          <a:fontRef idx="minor">
-            <a:schemeClr val="tx1"/>
-          </a:fontRef>
-        </p:style>
-      </p:cxnSp>
-      <p:cxnSp>
-        <p:nvCxnSpPr>
-          <p:cNvPr id="52" name="Gerader Verbinder 51"/>
-          <p:cNvCxnSpPr>
-            <a:stCxn id="4" idx="3"/>
-            <a:endCxn id="13" idx="0"/>
-          </p:cNvCxnSpPr>
-          <p:nvPr/>
-        </p:nvCxnSpPr>
-        <p:spPr>
-          <a:xfrm>
-            <a:off x="2530714" y="1271847"/>
-            <a:ext cx="1812577" cy="250991"/>
+            <a:ext cx="11686" cy="250991"/>
           </a:xfrm>
           <a:prstGeom prst="line">
             <a:avLst/>
@@ -4753,8 +4467,8 @@
         </p:nvCxnSpPr>
         <p:spPr>
           <a:xfrm flipH="1">
-            <a:off x="8746012" y="3595129"/>
-            <a:ext cx="892709" cy="266473"/>
+            <a:off x="8948754" y="2782394"/>
+            <a:ext cx="1463051" cy="356090"/>
           </a:xfrm>
           <a:prstGeom prst="line">
             <a:avLst/>
@@ -4795,8 +4509,8 @@
         </p:nvCxnSpPr>
         <p:spPr>
           <a:xfrm>
-            <a:off x="9638721" y="3595129"/>
-            <a:ext cx="853063" cy="266473"/>
+            <a:off x="10411805" y="2782394"/>
+            <a:ext cx="689957" cy="510612"/>
           </a:xfrm>
           <a:prstGeom prst="line">
             <a:avLst/>
@@ -4837,8 +4551,8 @@
         </p:nvCxnSpPr>
         <p:spPr>
           <a:xfrm flipH="1">
-            <a:off x="2688003" y="4947416"/>
-            <a:ext cx="2229387" cy="349117"/>
+            <a:off x="2688003" y="4856268"/>
+            <a:ext cx="2533542" cy="440265"/>
           </a:xfrm>
           <a:prstGeom prst="line">
             <a:avLst/>
@@ -4879,8 +4593,8 @@
         </p:nvCxnSpPr>
         <p:spPr>
           <a:xfrm>
-            <a:off x="4917390" y="4947416"/>
-            <a:ext cx="1587675" cy="356055"/>
+            <a:off x="5221545" y="4856268"/>
+            <a:ext cx="1283520" cy="447203"/>
           </a:xfrm>
           <a:prstGeom prst="line">
             <a:avLst/>
@@ -4910,31 +4624,132 @@
           </a:fontRef>
         </p:style>
       </p:cxnSp>
+      <p:grpSp>
+        <p:nvGrpSpPr>
+          <p:cNvPr id="71" name="Gruppieren 70"/>
+          <p:cNvGrpSpPr/>
+          <p:nvPr/>
+        </p:nvGrpSpPr>
+        <p:grpSpPr>
+          <a:xfrm>
+            <a:off x="753679" y="4041168"/>
+            <a:ext cx="851826" cy="698269"/>
+            <a:chOff x="224442" y="3981796"/>
+            <a:chExt cx="1379913" cy="698269"/>
+          </a:xfrm>
+        </p:grpSpPr>
+        <p:sp>
+          <p:nvSpPr>
+            <p:cNvPr id="72" name="Rechteck 71"/>
+            <p:cNvSpPr/>
+            <p:nvPr/>
+          </p:nvSpPr>
+          <p:spPr>
+            <a:xfrm>
+              <a:off x="224442" y="3981796"/>
+              <a:ext cx="1379913" cy="698269"/>
+            </a:xfrm>
+            <a:prstGeom prst="rect">
+              <a:avLst/>
+            </a:prstGeom>
+          </p:spPr>
+          <p:style>
+            <a:lnRef idx="2">
+              <a:schemeClr val="dk1"/>
+            </a:lnRef>
+            <a:fillRef idx="1">
+              <a:schemeClr val="lt1"/>
+            </a:fillRef>
+            <a:effectRef idx="0">
+              <a:schemeClr val="dk1"/>
+            </a:effectRef>
+            <a:fontRef idx="minor">
+              <a:schemeClr val="dk1"/>
+            </a:fontRef>
+          </p:style>
+          <p:txBody>
+            <a:bodyPr rtlCol="0" anchor="ctr"/>
+            <a:lstStyle/>
+            <a:p>
+              <a:pPr algn="ctr"/>
+              <a:r>
+                <a:rPr lang="de-DE" dirty="0" smtClean="0"/>
+                <a:t>ja</a:t>
+              </a:r>
+              <a:endParaRPr lang="de-DE" dirty="0"/>
+            </a:p>
+          </p:txBody>
+        </p:sp>
+        <p:sp>
+          <p:nvSpPr>
+            <p:cNvPr id="75" name="Rechteck 74"/>
+            <p:cNvSpPr/>
+            <p:nvPr/>
+          </p:nvSpPr>
+          <p:spPr>
+            <a:xfrm>
+              <a:off x="224444" y="3981796"/>
+              <a:ext cx="383949" cy="342288"/>
+            </a:xfrm>
+            <a:prstGeom prst="rect">
+              <a:avLst/>
+            </a:prstGeom>
+          </p:spPr>
+          <p:style>
+            <a:lnRef idx="2">
+              <a:schemeClr val="dk1">
+                <a:shade val="50000"/>
+              </a:schemeClr>
+            </a:lnRef>
+            <a:fillRef idx="1">
+              <a:schemeClr val="dk1"/>
+            </a:fillRef>
+            <a:effectRef idx="0">
+              <a:schemeClr val="dk1"/>
+            </a:effectRef>
+            <a:fontRef idx="minor">
+              <a:schemeClr val="lt1"/>
+            </a:fontRef>
+          </p:style>
+          <p:txBody>
+            <a:bodyPr rtlCol="0" anchor="ctr"/>
+            <a:lstStyle/>
+            <a:p>
+              <a:pPr algn="ctr"/>
+              <a:r>
+                <a:rPr lang="de-DE" dirty="0" smtClean="0"/>
+                <a:t>V</a:t>
+              </a:r>
+              <a:endParaRPr lang="de-DE" dirty="0"/>
+            </a:p>
+          </p:txBody>
+        </p:sp>
+      </p:grpSp>
       <p:cxnSp>
         <p:nvCxnSpPr>
-          <p:cNvPr id="66" name="Gerade Verbindung mit Pfeil 65"/>
+          <p:cNvPr id="76" name="Gerader Verbinder 75"/>
           <p:cNvCxnSpPr>
-            <a:stCxn id="10" idx="2"/>
-            <a:endCxn id="29" idx="0"/>
+            <a:stCxn id="28" idx="3"/>
+            <a:endCxn id="72" idx="0"/>
           </p:cNvCxnSpPr>
           <p:nvPr/>
         </p:nvCxnSpPr>
         <p:spPr>
-          <a:xfrm>
-            <a:off x="1044855" y="2207008"/>
-            <a:ext cx="862282" cy="342187"/>
+          <a:xfrm flipH="1">
+            <a:off x="1179592" y="3704665"/>
+            <a:ext cx="731704" cy="336503"/>
           </a:xfrm>
-          <a:prstGeom prst="straightConnector1">
+          <a:prstGeom prst="line">
             <a:avLst/>
           </a:prstGeom>
           <a:ln w="9525" cap="flat" cmpd="sng" algn="ctr">
             <a:solidFill>
               <a:schemeClr val="dk1"/>
             </a:solidFill>
-            <a:prstDash val="sysDot"/>
+            <a:prstDash val="dash"/>
             <a:round/>
             <a:headEnd type="none" w="med" len="med"/>
-            <a:tailEnd type="arrow" w="med" len="med"/>
+            <a:tailEnd type="none" w="med" len="med"/>
           </a:ln>
         </p:spPr>
         <p:style>
@@ -4952,31 +4767,132 @@
           </a:fontRef>
         </p:style>
       </p:cxnSp>
+      <p:grpSp>
+        <p:nvGrpSpPr>
+          <p:cNvPr id="78" name="Gruppieren 77"/>
+          <p:cNvGrpSpPr/>
+          <p:nvPr/>
+        </p:nvGrpSpPr>
+        <p:grpSpPr>
+          <a:xfrm>
+            <a:off x="2175327" y="4092543"/>
+            <a:ext cx="851826" cy="698269"/>
+            <a:chOff x="224442" y="3981796"/>
+            <a:chExt cx="1379913" cy="698269"/>
+          </a:xfrm>
+        </p:grpSpPr>
+        <p:sp>
+          <p:nvSpPr>
+            <p:cNvPr id="79" name="Rechteck 78"/>
+            <p:cNvSpPr/>
+            <p:nvPr/>
+          </p:nvSpPr>
+          <p:spPr>
+            <a:xfrm>
+              <a:off x="224442" y="3981796"/>
+              <a:ext cx="1379913" cy="698269"/>
+            </a:xfrm>
+            <a:prstGeom prst="rect">
+              <a:avLst/>
+            </a:prstGeom>
+          </p:spPr>
+          <p:style>
+            <a:lnRef idx="2">
+              <a:schemeClr val="dk1"/>
+            </a:lnRef>
+            <a:fillRef idx="1">
+              <a:schemeClr val="lt1"/>
+            </a:fillRef>
+            <a:effectRef idx="0">
+              <a:schemeClr val="dk1"/>
+            </a:effectRef>
+            <a:fontRef idx="minor">
+              <a:schemeClr val="dk1"/>
+            </a:fontRef>
+          </p:style>
+          <p:txBody>
+            <a:bodyPr rtlCol="0" anchor="ctr"/>
+            <a:lstStyle/>
+            <a:p>
+              <a:pPr algn="ctr"/>
+              <a:r>
+                <a:rPr lang="de-DE" dirty="0" smtClean="0"/>
+                <a:t>nein</a:t>
+              </a:r>
+              <a:endParaRPr lang="de-DE" dirty="0"/>
+            </a:p>
+          </p:txBody>
+        </p:sp>
+        <p:sp>
+          <p:nvSpPr>
+            <p:cNvPr id="81" name="Rechteck 80"/>
+            <p:cNvSpPr/>
+            <p:nvPr/>
+          </p:nvSpPr>
+          <p:spPr>
+            <a:xfrm>
+              <a:off x="224444" y="3981796"/>
+              <a:ext cx="383949" cy="342288"/>
+            </a:xfrm>
+            <a:prstGeom prst="rect">
+              <a:avLst/>
+            </a:prstGeom>
+          </p:spPr>
+          <p:style>
+            <a:lnRef idx="2">
+              <a:schemeClr val="dk1">
+                <a:shade val="50000"/>
+              </a:schemeClr>
+            </a:lnRef>
+            <a:fillRef idx="1">
+              <a:schemeClr val="dk1"/>
+            </a:fillRef>
+            <a:effectRef idx="0">
+              <a:schemeClr val="dk1"/>
+            </a:effectRef>
+            <a:fontRef idx="minor">
+              <a:schemeClr val="lt1"/>
+            </a:fontRef>
+          </p:style>
+          <p:txBody>
+            <a:bodyPr rtlCol="0" anchor="ctr"/>
+            <a:lstStyle/>
+            <a:p>
+              <a:pPr algn="ctr"/>
+              <a:r>
+                <a:rPr lang="de-DE" dirty="0" smtClean="0"/>
+                <a:t>V</a:t>
+              </a:r>
+              <a:endParaRPr lang="de-DE" dirty="0"/>
+            </a:p>
+          </p:txBody>
+        </p:sp>
+      </p:grpSp>
       <p:cxnSp>
         <p:nvCxnSpPr>
-          <p:cNvPr id="67" name="Gerade Verbindung mit Pfeil 66"/>
+          <p:cNvPr id="82" name="Gerader Verbinder 81"/>
           <p:cNvCxnSpPr>
-            <a:stCxn id="5" idx="2"/>
-            <a:endCxn id="29" idx="0"/>
+            <a:stCxn id="28" idx="3"/>
+            <a:endCxn id="79" idx="0"/>
           </p:cNvCxnSpPr>
           <p:nvPr/>
         </p:nvCxnSpPr>
         <p:spPr>
-          <a:xfrm flipH="1">
-            <a:off x="1907137" y="2221107"/>
-            <a:ext cx="780867" cy="328088"/>
+          <a:xfrm>
+            <a:off x="1911296" y="3704665"/>
+            <a:ext cx="689944" cy="387878"/>
           </a:xfrm>
-          <a:prstGeom prst="straightConnector1">
+          <a:prstGeom prst="line">
             <a:avLst/>
           </a:prstGeom>
           <a:ln w="9525" cap="flat" cmpd="sng" algn="ctr">
             <a:solidFill>
-              <a:schemeClr val="tx1"/>
+              <a:schemeClr val="dk1"/>
             </a:solidFill>
-            <a:prstDash val="sysDot"/>
+            <a:prstDash val="dash"/>
             <a:round/>
             <a:headEnd type="none" w="med" len="med"/>
-            <a:tailEnd type="arrow" w="med" len="med"/>
+            <a:tailEnd type="none" w="med" len="med"/>
           </a:ln>
         </p:spPr>
         <p:style>
@@ -4994,31 +4910,132 @@
           </a:fontRef>
         </p:style>
       </p:cxnSp>
+      <p:grpSp>
+        <p:nvGrpSpPr>
+          <p:cNvPr id="84" name="Gruppieren 83"/>
+          <p:cNvGrpSpPr/>
+          <p:nvPr/>
+        </p:nvGrpSpPr>
+        <p:grpSpPr>
+          <a:xfrm>
+            <a:off x="9212797" y="5789587"/>
+            <a:ext cx="851826" cy="698269"/>
+            <a:chOff x="224442" y="3981796"/>
+            <a:chExt cx="1379913" cy="698269"/>
+          </a:xfrm>
+        </p:grpSpPr>
+        <p:sp>
+          <p:nvSpPr>
+            <p:cNvPr id="85" name="Rechteck 84"/>
+            <p:cNvSpPr/>
+            <p:nvPr/>
+          </p:nvSpPr>
+          <p:spPr>
+            <a:xfrm>
+              <a:off x="224442" y="3981796"/>
+              <a:ext cx="1379913" cy="698269"/>
+            </a:xfrm>
+            <a:prstGeom prst="rect">
+              <a:avLst/>
+            </a:prstGeom>
+          </p:spPr>
+          <p:style>
+            <a:lnRef idx="2">
+              <a:schemeClr val="dk1"/>
+            </a:lnRef>
+            <a:fillRef idx="1">
+              <a:schemeClr val="lt1"/>
+            </a:fillRef>
+            <a:effectRef idx="0">
+              <a:schemeClr val="dk1"/>
+            </a:effectRef>
+            <a:fontRef idx="minor">
+              <a:schemeClr val="dk1"/>
+            </a:fontRef>
+          </p:style>
+          <p:txBody>
+            <a:bodyPr rtlCol="0" anchor="ctr"/>
+            <a:lstStyle/>
+            <a:p>
+              <a:pPr algn="ctr"/>
+              <a:r>
+                <a:rPr lang="de-DE" dirty="0" smtClean="0"/>
+                <a:t>ja</a:t>
+              </a:r>
+              <a:endParaRPr lang="de-DE" dirty="0"/>
+            </a:p>
+          </p:txBody>
+        </p:sp>
+        <p:sp>
+          <p:nvSpPr>
+            <p:cNvPr id="87" name="Rechteck 86"/>
+            <p:cNvSpPr/>
+            <p:nvPr/>
+          </p:nvSpPr>
+          <p:spPr>
+            <a:xfrm>
+              <a:off x="224444" y="3981796"/>
+              <a:ext cx="383949" cy="342288"/>
+            </a:xfrm>
+            <a:prstGeom prst="rect">
+              <a:avLst/>
+            </a:prstGeom>
+          </p:spPr>
+          <p:style>
+            <a:lnRef idx="2">
+              <a:schemeClr val="dk1">
+                <a:shade val="50000"/>
+              </a:schemeClr>
+            </a:lnRef>
+            <a:fillRef idx="1">
+              <a:schemeClr val="dk1"/>
+            </a:fillRef>
+            <a:effectRef idx="0">
+              <a:schemeClr val="dk1"/>
+            </a:effectRef>
+            <a:fontRef idx="minor">
+              <a:schemeClr val="lt1"/>
+            </a:fontRef>
+          </p:style>
+          <p:txBody>
+            <a:bodyPr rtlCol="0" anchor="ctr"/>
+            <a:lstStyle/>
+            <a:p>
+              <a:pPr algn="ctr"/>
+              <a:r>
+                <a:rPr lang="de-DE" dirty="0" smtClean="0"/>
+                <a:t>V</a:t>
+              </a:r>
+              <a:endParaRPr lang="de-DE" dirty="0"/>
+            </a:p>
+          </p:txBody>
+        </p:sp>
+      </p:grpSp>
       <p:cxnSp>
         <p:nvCxnSpPr>
-          <p:cNvPr id="70" name="Gerade Verbindung mit Pfeil 69"/>
+          <p:cNvPr id="88" name="Gerader Verbinder 87"/>
           <p:cNvCxnSpPr>
-            <a:stCxn id="13" idx="2"/>
-            <a:endCxn id="29" idx="0"/>
+            <a:stCxn id="49" idx="3"/>
+            <a:endCxn id="85" idx="0"/>
           </p:cNvCxnSpPr>
           <p:nvPr/>
         </p:nvCxnSpPr>
         <p:spPr>
           <a:xfrm flipH="1">
-            <a:off x="1907137" y="2221107"/>
-            <a:ext cx="2436154" cy="328088"/>
+            <a:off x="9638710" y="5452339"/>
+            <a:ext cx="743697" cy="337248"/>
           </a:xfrm>
-          <a:prstGeom prst="straightConnector1">
+          <a:prstGeom prst="line">
             <a:avLst/>
           </a:prstGeom>
           <a:ln w="9525" cap="flat" cmpd="sng" algn="ctr">
             <a:solidFill>
-              <a:schemeClr val="tx1"/>
+              <a:schemeClr val="dk1"/>
             </a:solidFill>
-            <a:prstDash val="sysDot"/>
+            <a:prstDash val="dash"/>
             <a:round/>
             <a:headEnd type="none" w="med" len="med"/>
-            <a:tailEnd type="arrow" w="med" len="med"/>
+            <a:tailEnd type="none" w="med" len="med"/>
           </a:ln>
         </p:spPr>
         <p:style>
@@ -5036,457 +5053,132 @@
           </a:fontRef>
         </p:style>
       </p:cxnSp>
-      <p:sp>
-        <p:nvSpPr>
-          <p:cNvPr id="73" name="Textfeld 72"/>
-          <p:cNvSpPr txBox="1"/>
+      <p:grpSp>
+        <p:nvGrpSpPr>
+          <p:cNvPr id="90" name="Gruppieren 89"/>
+          <p:cNvGrpSpPr/>
           <p:nvPr/>
-        </p:nvSpPr>
-        <p:spPr>
-          <a:xfrm rot="21256650">
-            <a:off x="3701086" y="2184899"/>
-            <a:ext cx="546945" cy="230832"/>
+        </p:nvGrpSpPr>
+        <p:grpSpPr>
+          <a:xfrm>
+            <a:off x="10749832" y="5685509"/>
+            <a:ext cx="851826" cy="698269"/>
+            <a:chOff x="224442" y="3981796"/>
+            <a:chExt cx="1379912" cy="698269"/>
           </a:xfrm>
-          <a:prstGeom prst="rect">
-            <a:avLst/>
-          </a:prstGeom>
-          <a:noFill/>
-        </p:spPr>
-        <p:txBody>
-          <a:bodyPr wrap="none" rtlCol="0">
-            <a:spAutoFit/>
-          </a:bodyPr>
-          <a:lstStyle/>
-          <a:p>
-            <a:r>
-              <a:rPr lang="de-DE" sz="900" dirty="0" err="1" smtClean="0"/>
-              <a:t>exclude</a:t>
-            </a:r>
-            <a:endParaRPr lang="de-DE" sz="900" dirty="0"/>
-          </a:p>
-        </p:txBody>
-      </p:sp>
+        </p:grpSpPr>
+        <p:sp>
+          <p:nvSpPr>
+            <p:cNvPr id="91" name="Rechteck 90"/>
+            <p:cNvSpPr/>
+            <p:nvPr/>
+          </p:nvSpPr>
+          <p:spPr>
+            <a:xfrm>
+              <a:off x="224442" y="3981796"/>
+              <a:ext cx="1379912" cy="698269"/>
+            </a:xfrm>
+            <a:prstGeom prst="rect">
+              <a:avLst/>
+            </a:prstGeom>
+          </p:spPr>
+          <p:style>
+            <a:lnRef idx="2">
+              <a:schemeClr val="dk1"/>
+            </a:lnRef>
+            <a:fillRef idx="1">
+              <a:schemeClr val="lt1"/>
+            </a:fillRef>
+            <a:effectRef idx="0">
+              <a:schemeClr val="dk1"/>
+            </a:effectRef>
+            <a:fontRef idx="minor">
+              <a:schemeClr val="dk1"/>
+            </a:fontRef>
+          </p:style>
+          <p:txBody>
+            <a:bodyPr rtlCol="0" anchor="ctr"/>
+            <a:lstStyle/>
+            <a:p>
+              <a:pPr algn="ctr"/>
+              <a:r>
+                <a:rPr lang="de-DE" dirty="0" smtClean="0"/>
+                <a:t>nein</a:t>
+              </a:r>
+              <a:endParaRPr lang="de-DE" dirty="0"/>
+            </a:p>
+          </p:txBody>
+        </p:sp>
+        <p:sp>
+          <p:nvSpPr>
+            <p:cNvPr id="92" name="Rechteck 91"/>
+            <p:cNvSpPr/>
+            <p:nvPr/>
+          </p:nvSpPr>
+          <p:spPr>
+            <a:xfrm>
+              <a:off x="224444" y="3981796"/>
+              <a:ext cx="383949" cy="342288"/>
+            </a:xfrm>
+            <a:prstGeom prst="rect">
+              <a:avLst/>
+            </a:prstGeom>
+          </p:spPr>
+          <p:style>
+            <a:lnRef idx="2">
+              <a:schemeClr val="dk1">
+                <a:shade val="50000"/>
+              </a:schemeClr>
+            </a:lnRef>
+            <a:fillRef idx="1">
+              <a:schemeClr val="dk1"/>
+            </a:fillRef>
+            <a:effectRef idx="0">
+              <a:schemeClr val="dk1"/>
+            </a:effectRef>
+            <a:fontRef idx="minor">
+              <a:schemeClr val="lt1"/>
+            </a:fontRef>
+          </p:style>
+          <p:txBody>
+            <a:bodyPr rtlCol="0" anchor="ctr"/>
+            <a:lstStyle/>
+            <a:p>
+              <a:pPr algn="ctr"/>
+              <a:r>
+                <a:rPr lang="de-DE" dirty="0" smtClean="0"/>
+                <a:t>V</a:t>
+              </a:r>
+              <a:endParaRPr lang="de-DE" dirty="0"/>
+            </a:p>
+          </p:txBody>
+        </p:sp>
+      </p:grpSp>
       <p:cxnSp>
         <p:nvCxnSpPr>
-          <p:cNvPr id="74" name="Gerade Verbindung mit Pfeil 73"/>
+          <p:cNvPr id="95" name="Gerader Verbinder 94"/>
           <p:cNvCxnSpPr>
-            <a:stCxn id="5" idx="2"/>
-            <a:endCxn id="50" idx="0"/>
+            <a:stCxn id="49" idx="3"/>
+            <a:endCxn id="91" idx="0"/>
           </p:cNvCxnSpPr>
           <p:nvPr/>
         </p:nvCxnSpPr>
         <p:spPr>
           <a:xfrm>
-            <a:off x="2688004" y="2221107"/>
-            <a:ext cx="7587376" cy="2922171"/>
+            <a:off x="10382407" y="5452339"/>
+            <a:ext cx="793338" cy="233170"/>
           </a:xfrm>
-          <a:prstGeom prst="straightConnector1">
+          <a:prstGeom prst="line">
             <a:avLst/>
           </a:prstGeom>
           <a:ln w="9525" cap="flat" cmpd="sng" algn="ctr">
             <a:solidFill>
-              <a:schemeClr val="tx1"/>
+              <a:schemeClr val="dk1"/>
             </a:solidFill>
-            <a:prstDash val="sysDot"/>
+            <a:prstDash val="dash"/>
             <a:round/>
             <a:headEnd type="none" w="med" len="med"/>
-            <a:tailEnd type="arrow" w="med" len="med"/>
-          </a:ln>
-        </p:spPr>
-        <p:style>
-          <a:lnRef idx="0">
-            <a:scrgbClr r="0" g="0" b="0"/>
-          </a:lnRef>
-          <a:fillRef idx="0">
-            <a:scrgbClr r="0" g="0" b="0"/>
-          </a:fillRef>
-          <a:effectRef idx="0">
-            <a:scrgbClr r="0" g="0" b="0"/>
-          </a:effectRef>
-          <a:fontRef idx="minor">
-            <a:schemeClr val="tx1"/>
-          </a:fontRef>
-        </p:style>
-      </p:cxnSp>
-      <p:cxnSp>
-        <p:nvCxnSpPr>
-          <p:cNvPr id="77" name="Gerade Verbindung mit Pfeil 76"/>
-          <p:cNvCxnSpPr>
-            <a:stCxn id="10" idx="2"/>
-            <a:endCxn id="37" idx="1"/>
-          </p:cNvCxnSpPr>
-          <p:nvPr/>
-        </p:nvCxnSpPr>
-        <p:spPr>
-          <a:xfrm flipV="1">
-            <a:off x="1044855" y="2102018"/>
-            <a:ext cx="4418089" cy="104990"/>
-          </a:xfrm>
-          <a:prstGeom prst="straightConnector1">
-            <a:avLst/>
-          </a:prstGeom>
-          <a:ln w="9525" cap="flat" cmpd="sng" algn="ctr">
-            <a:solidFill>
-              <a:schemeClr val="dk1"/>
-            </a:solidFill>
-            <a:prstDash val="sysDot"/>
-            <a:round/>
-            <a:headEnd type="none" w="med" len="med"/>
-            <a:tailEnd type="arrow" w="med" len="med"/>
-          </a:ln>
-        </p:spPr>
-        <p:style>
-          <a:lnRef idx="0">
-            <a:scrgbClr r="0" g="0" b="0"/>
-          </a:lnRef>
-          <a:fillRef idx="0">
-            <a:scrgbClr r="0" g="0" b="0"/>
-          </a:fillRef>
-          <a:effectRef idx="0">
-            <a:scrgbClr r="0" g="0" b="0"/>
-          </a:effectRef>
-          <a:fontRef idx="minor">
-            <a:schemeClr val="tx1"/>
-          </a:fontRef>
-        </p:style>
-      </p:cxnSp>
-      <p:cxnSp>
-        <p:nvCxnSpPr>
-          <p:cNvPr id="80" name="Gerade Verbindung mit Pfeil 79"/>
-          <p:cNvCxnSpPr>
-            <a:stCxn id="10" idx="2"/>
-            <a:endCxn id="22" idx="1"/>
-          </p:cNvCxnSpPr>
-          <p:nvPr/>
-        </p:nvCxnSpPr>
-        <p:spPr>
-          <a:xfrm>
-            <a:off x="1044855" y="2207008"/>
-            <a:ext cx="7011200" cy="2003729"/>
-          </a:xfrm>
-          <a:prstGeom prst="straightConnector1">
-            <a:avLst/>
-          </a:prstGeom>
-          <a:ln w="9525" cap="flat" cmpd="sng" algn="ctr">
-            <a:solidFill>
-              <a:schemeClr val="dk1"/>
-            </a:solidFill>
-            <a:prstDash val="sysDot"/>
-            <a:round/>
-            <a:headEnd type="none" w="med" len="med"/>
-            <a:tailEnd type="arrow" w="med" len="med"/>
-          </a:ln>
-        </p:spPr>
-        <p:style>
-          <a:lnRef idx="0">
-            <a:scrgbClr r="0" g="0" b="0"/>
-          </a:lnRef>
-          <a:fillRef idx="0">
-            <a:scrgbClr r="0" g="0" b="0"/>
-          </a:fillRef>
-          <a:effectRef idx="0">
-            <a:scrgbClr r="0" g="0" b="0"/>
-          </a:effectRef>
-          <a:fontRef idx="minor">
-            <a:schemeClr val="tx1"/>
-          </a:fontRef>
-        </p:style>
-      </p:cxnSp>
-      <p:cxnSp>
-        <p:nvCxnSpPr>
-          <p:cNvPr id="83" name="Gerade Verbindung mit Pfeil 82"/>
-          <p:cNvCxnSpPr>
-            <a:stCxn id="13" idx="2"/>
-            <a:endCxn id="40" idx="1"/>
-          </p:cNvCxnSpPr>
-          <p:nvPr/>
-        </p:nvCxnSpPr>
-        <p:spPr>
-          <a:xfrm flipV="1">
-            <a:off x="4343291" y="2102018"/>
-            <a:ext cx="3022808" cy="119089"/>
-          </a:xfrm>
-          <a:prstGeom prst="straightConnector1">
-            <a:avLst/>
-          </a:prstGeom>
-          <a:ln w="9525" cap="flat" cmpd="sng" algn="ctr">
-            <a:solidFill>
-              <a:schemeClr val="dk1"/>
-            </a:solidFill>
-            <a:prstDash val="sysDot"/>
-            <a:round/>
-            <a:headEnd type="none" w="med" len="med"/>
-            <a:tailEnd type="arrow" w="med" len="med"/>
-          </a:ln>
-        </p:spPr>
-        <p:style>
-          <a:lnRef idx="0">
-            <a:scrgbClr r="0" g="0" b="0"/>
-          </a:lnRef>
-          <a:fillRef idx="0">
-            <a:scrgbClr r="0" g="0" b="0"/>
-          </a:fillRef>
-          <a:effectRef idx="0">
-            <a:scrgbClr r="0" g="0" b="0"/>
-          </a:effectRef>
-          <a:fontRef idx="minor">
-            <a:schemeClr val="tx1"/>
-          </a:fontRef>
-        </p:style>
-      </p:cxnSp>
-      <p:cxnSp>
-        <p:nvCxnSpPr>
-          <p:cNvPr id="86" name="Gerade Verbindung mit Pfeil 85"/>
-          <p:cNvCxnSpPr>
-            <a:stCxn id="13" idx="2"/>
-            <a:endCxn id="25" idx="1"/>
-          </p:cNvCxnSpPr>
-          <p:nvPr/>
-        </p:nvCxnSpPr>
-        <p:spPr>
-          <a:xfrm>
-            <a:off x="4343291" y="2221107"/>
-            <a:ext cx="5458536" cy="1989630"/>
-          </a:xfrm>
-          <a:prstGeom prst="straightConnector1">
-            <a:avLst/>
-          </a:prstGeom>
-          <a:ln w="9525" cap="flat" cmpd="sng" algn="ctr">
-            <a:solidFill>
-              <a:schemeClr val="dk1"/>
-            </a:solidFill>
-            <a:prstDash val="sysDot"/>
-            <a:round/>
-            <a:headEnd type="none" w="med" len="med"/>
-            <a:tailEnd type="arrow" w="med" len="med"/>
-          </a:ln>
-        </p:spPr>
-        <p:style>
-          <a:lnRef idx="0">
-            <a:scrgbClr r="0" g="0" b="0"/>
-          </a:lnRef>
-          <a:fillRef idx="0">
-            <a:scrgbClr r="0" g="0" b="0"/>
-          </a:fillRef>
-          <a:effectRef idx="0">
-            <a:scrgbClr r="0" g="0" b="0"/>
-          </a:effectRef>
-          <a:fontRef idx="minor">
-            <a:schemeClr val="tx1"/>
-          </a:fontRef>
-        </p:style>
-      </p:cxnSp>
-      <p:cxnSp>
-        <p:nvCxnSpPr>
-          <p:cNvPr id="89" name="Gerade Verbindung mit Pfeil 88"/>
-          <p:cNvCxnSpPr>
-            <a:stCxn id="13" idx="2"/>
-            <a:endCxn id="49" idx="1"/>
-          </p:cNvCxnSpPr>
-          <p:nvPr/>
-        </p:nvCxnSpPr>
-        <p:spPr>
-          <a:xfrm>
-            <a:off x="4343291" y="2221107"/>
-            <a:ext cx="5118544" cy="3550625"/>
-          </a:xfrm>
-          <a:prstGeom prst="straightConnector1">
-            <a:avLst/>
-          </a:prstGeom>
-          <a:ln w="9525" cap="flat" cmpd="sng" algn="ctr">
-            <a:solidFill>
-              <a:schemeClr val="tx1"/>
-            </a:solidFill>
-            <a:prstDash val="sysDot"/>
-            <a:round/>
-            <a:headEnd type="none" w="med" len="med"/>
-            <a:tailEnd type="arrow" w="med" len="med"/>
-          </a:ln>
-        </p:spPr>
-        <p:style>
-          <a:lnRef idx="0">
-            <a:scrgbClr r="0" g="0" b="0"/>
-          </a:lnRef>
-          <a:fillRef idx="0">
-            <a:scrgbClr r="0" g="0" b="0"/>
-          </a:fillRef>
-          <a:effectRef idx="0">
-            <a:scrgbClr r="0" g="0" b="0"/>
-          </a:effectRef>
-          <a:fontRef idx="minor">
-            <a:schemeClr val="tx1"/>
-          </a:fontRef>
-        </p:style>
-      </p:cxnSp>
-      <p:sp>
-        <p:nvSpPr>
-          <p:cNvPr id="93" name="Textfeld 92"/>
-          <p:cNvSpPr txBox="1"/>
-          <p:nvPr/>
-        </p:nvSpPr>
-        <p:spPr>
-          <a:xfrm rot="1958948">
-            <a:off x="8873527" y="5391065"/>
-            <a:ext cx="546945" cy="230832"/>
-          </a:xfrm>
-          <a:prstGeom prst="rect">
-            <a:avLst/>
-          </a:prstGeom>
-          <a:noFill/>
-        </p:spPr>
-        <p:txBody>
-          <a:bodyPr wrap="none" rtlCol="0">
-            <a:spAutoFit/>
-          </a:bodyPr>
-          <a:lstStyle/>
-          <a:p>
-            <a:r>
-              <a:rPr lang="de-DE" sz="900" dirty="0" err="1" smtClean="0"/>
-              <a:t>exclude</a:t>
-            </a:r>
-            <a:endParaRPr lang="de-DE" sz="900" dirty="0"/>
-          </a:p>
-        </p:txBody>
-      </p:sp>
-      <p:cxnSp>
-        <p:nvCxnSpPr>
-          <p:cNvPr id="94" name="Gerade Verbindung mit Pfeil 93"/>
-          <p:cNvCxnSpPr>
-            <a:stCxn id="10" idx="2"/>
-            <a:endCxn id="49" idx="1"/>
-          </p:cNvCxnSpPr>
-          <p:nvPr/>
-        </p:nvCxnSpPr>
-        <p:spPr>
-          <a:xfrm>
-            <a:off x="1044855" y="2207008"/>
-            <a:ext cx="8416980" cy="3564724"/>
-          </a:xfrm>
-          <a:prstGeom prst="straightConnector1">
-            <a:avLst/>
-          </a:prstGeom>
-          <a:ln w="9525" cap="flat" cmpd="sng" algn="ctr">
-            <a:solidFill>
-              <a:schemeClr val="tx1"/>
-            </a:solidFill>
-            <a:prstDash val="sysDot"/>
-            <a:round/>
-            <a:headEnd type="none" w="med" len="med"/>
-            <a:tailEnd type="arrow" w="med" len="med"/>
-          </a:ln>
-        </p:spPr>
-        <p:style>
-          <a:lnRef idx="0">
-            <a:scrgbClr r="0" g="0" b="0"/>
-          </a:lnRef>
-          <a:fillRef idx="0">
-            <a:scrgbClr r="0" g="0" b="0"/>
-          </a:fillRef>
-          <a:effectRef idx="0">
-            <a:scrgbClr r="0" g="0" b="0"/>
-          </a:effectRef>
-          <a:fontRef idx="minor">
-            <a:schemeClr val="tx1"/>
-          </a:fontRef>
-        </p:style>
-      </p:cxnSp>
-      <p:sp>
-        <p:nvSpPr>
-          <p:cNvPr id="97" name="Textfeld 96"/>
-          <p:cNvSpPr txBox="1"/>
-          <p:nvPr/>
-        </p:nvSpPr>
-        <p:spPr>
-          <a:xfrm rot="1383941">
-            <a:off x="8429943" y="5268656"/>
-            <a:ext cx="546945" cy="230832"/>
-          </a:xfrm>
-          <a:prstGeom prst="rect">
-            <a:avLst/>
-          </a:prstGeom>
-          <a:noFill/>
-        </p:spPr>
-        <p:txBody>
-          <a:bodyPr wrap="none" rtlCol="0">
-            <a:spAutoFit/>
-          </a:bodyPr>
-          <a:lstStyle/>
-          <a:p>
-            <a:r>
-              <a:rPr lang="de-DE" sz="900" dirty="0" err="1" smtClean="0"/>
-              <a:t>exclude</a:t>
-            </a:r>
-            <a:endParaRPr lang="de-DE" sz="900" dirty="0"/>
-          </a:p>
-        </p:txBody>
-      </p:sp>
-      <p:cxnSp>
-        <p:nvCxnSpPr>
-          <p:cNvPr id="98" name="Gerade Verbindung mit Pfeil 97"/>
-          <p:cNvCxnSpPr>
-            <a:stCxn id="5" idx="2"/>
-            <a:endCxn id="37" idx="2"/>
-          </p:cNvCxnSpPr>
-          <p:nvPr/>
-        </p:nvCxnSpPr>
-        <p:spPr>
-          <a:xfrm>
-            <a:off x="2688004" y="2221107"/>
-            <a:ext cx="3464897" cy="230045"/>
-          </a:xfrm>
-          <a:prstGeom prst="straightConnector1">
-            <a:avLst/>
-          </a:prstGeom>
-          <a:ln w="9525" cap="flat" cmpd="sng" algn="ctr">
-            <a:solidFill>
-              <a:schemeClr val="tx1"/>
-            </a:solidFill>
-            <a:prstDash val="sysDot"/>
-            <a:round/>
-            <a:headEnd type="none" w="med" len="med"/>
-            <a:tailEnd type="arrow" w="med" len="med"/>
-          </a:ln>
-        </p:spPr>
-        <p:style>
-          <a:lnRef idx="0">
-            <a:scrgbClr r="0" g="0" b="0"/>
-          </a:lnRef>
-          <a:fillRef idx="0">
-            <a:scrgbClr r="0" g="0" b="0"/>
-          </a:fillRef>
-          <a:effectRef idx="0">
-            <a:scrgbClr r="0" g="0" b="0"/>
-          </a:effectRef>
-          <a:fontRef idx="minor">
-            <a:schemeClr val="tx1"/>
-          </a:fontRef>
-        </p:style>
-      </p:cxnSp>
-      <p:cxnSp>
-        <p:nvCxnSpPr>
-          <p:cNvPr id="101" name="Gerade Verbindung mit Pfeil 100"/>
-          <p:cNvCxnSpPr>
-            <a:stCxn id="5" idx="2"/>
-            <a:endCxn id="22" idx="1"/>
-          </p:cNvCxnSpPr>
-          <p:nvPr/>
-        </p:nvCxnSpPr>
-        <p:spPr>
-          <a:xfrm>
-            <a:off x="2688004" y="2221107"/>
-            <a:ext cx="5368051" cy="1989630"/>
-          </a:xfrm>
-          <a:prstGeom prst="straightConnector1">
-            <a:avLst/>
-          </a:prstGeom>
-          <a:ln w="9525" cap="flat" cmpd="sng" algn="ctr">
-            <a:solidFill>
-              <a:schemeClr val="tx1"/>
-            </a:solidFill>
-            <a:prstDash val="sysDot"/>
-            <a:round/>
-            <a:headEnd type="none" w="med" len="med"/>
-            <a:tailEnd type="arrow" w="med" len="med"/>
+            <a:tailEnd type="none" w="med" len="med"/>
           </a:ln>
         </p:spPr>
         <p:style>

</xml_diff>